<commit_message>
Updated slides with link to repo
</commit_message>
<xml_diff>
--- a/Modern_backends_for_mobile_apps.pptx
+++ b/Modern_backends_for_mobile_apps.pptx
@@ -6556,7 +6556,7 @@
         <p:spPr>
           <a:xfrm>
             <a:off x="1524000" y="389965"/>
-            <a:ext cx="9144000" cy="3119998"/>
+            <a:ext cx="10255624" cy="3119998"/>
           </a:xfrm>
         </p:spPr>
         <p:txBody>
@@ -6586,12 +6586,20 @@
               <a:t>App</a:t>
             </a:r>
             <a:r>
-              <a:rPr lang="en-US" dirty="0"/>
+              <a:rPr lang="en-US"/>
               <a:t>: </a:t>
             </a:r>
             <a:r>
+              <a:rPr lang="en-US" smtClean="0"/>
+              <a:t>  </a:t>
+            </a:r>
+            <a:r>
+              <a:rPr lang="en-US" sz="5300" smtClean="0"/>
+              <a:t>https</a:t>
+            </a:r>
+            <a:r>
               <a:rPr lang="en-US" sz="5300" dirty="0" smtClean="0"/>
-              <a:t>https://</a:t>
+              <a:t>://</a:t>
             </a:r>
             <a:r>
               <a:rPr lang="en-US" sz="5300" dirty="0" err="1" smtClean="0"/>
@@ -6614,7 +6622,15 @@
             </a:r>
             <a:r>
               <a:rPr lang="en-US" sz="5300" dirty="0" smtClean="0"/>
-              <a:t>&lt;&lt; TODO &gt;&gt;</a:t>
+              <a:t>https://</a:t>
+            </a:r>
+            <a:r>
+              <a:rPr lang="en-US" sz="5300" dirty="0" err="1"/>
+              <a:t>s.sashag.net</a:t>
+            </a:r>
+            <a:r>
+              <a:rPr lang="en-US" sz="5300" dirty="0"/>
+              <a:t>/shoppy16src</a:t>
             </a:r>
             <a:endParaRPr lang="en-US" dirty="0"/>
           </a:p>

</xml_diff>